<commit_message>
Add intensity plots to doc; update top-level diagram
</commit_message>
<xml_diff>
--- a/docs/methodology/plots/top_level_view.pptx
+++ b/docs/methodology/plots/top_level_view.pptx
@@ -261,7 +261,7 @@
           <a:p>
             <a:fld id="{7CFC6544-A9AE-4A12-916D-21615692FB1B}" type="datetimeFigureOut">
               <a:rPr lang="en-GB" smtClean="0"/>
-              <a:t>11/10/2021</a:t>
+              <a:t>18/10/2021</a:t>
             </a:fld>
             <a:endParaRPr lang="en-GB"/>
           </a:p>
@@ -461,7 +461,7 @@
           <a:p>
             <a:fld id="{7CFC6544-A9AE-4A12-916D-21615692FB1B}" type="datetimeFigureOut">
               <a:rPr lang="en-GB" smtClean="0"/>
-              <a:t>11/10/2021</a:t>
+              <a:t>18/10/2021</a:t>
             </a:fld>
             <a:endParaRPr lang="en-GB"/>
           </a:p>
@@ -671,7 +671,7 @@
           <a:p>
             <a:fld id="{7CFC6544-A9AE-4A12-916D-21615692FB1B}" type="datetimeFigureOut">
               <a:rPr lang="en-GB" smtClean="0"/>
-              <a:t>11/10/2021</a:t>
+              <a:t>18/10/2021</a:t>
             </a:fld>
             <a:endParaRPr lang="en-GB"/>
           </a:p>
@@ -871,7 +871,7 @@
           <a:p>
             <a:fld id="{7CFC6544-A9AE-4A12-916D-21615692FB1B}" type="datetimeFigureOut">
               <a:rPr lang="en-GB" smtClean="0"/>
-              <a:t>11/10/2021</a:t>
+              <a:t>18/10/2021</a:t>
             </a:fld>
             <a:endParaRPr lang="en-GB"/>
           </a:p>
@@ -1147,7 +1147,7 @@
           <a:p>
             <a:fld id="{7CFC6544-A9AE-4A12-916D-21615692FB1B}" type="datetimeFigureOut">
               <a:rPr lang="en-GB" smtClean="0"/>
-              <a:t>11/10/2021</a:t>
+              <a:t>18/10/2021</a:t>
             </a:fld>
             <a:endParaRPr lang="en-GB"/>
           </a:p>
@@ -1415,7 +1415,7 @@
           <a:p>
             <a:fld id="{7CFC6544-A9AE-4A12-916D-21615692FB1B}" type="datetimeFigureOut">
               <a:rPr lang="en-GB" smtClean="0"/>
-              <a:t>11/10/2021</a:t>
+              <a:t>18/10/2021</a:t>
             </a:fld>
             <a:endParaRPr lang="en-GB"/>
           </a:p>
@@ -1830,7 +1830,7 @@
           <a:p>
             <a:fld id="{7CFC6544-A9AE-4A12-916D-21615692FB1B}" type="datetimeFigureOut">
               <a:rPr lang="en-GB" smtClean="0"/>
-              <a:t>11/10/2021</a:t>
+              <a:t>18/10/2021</a:t>
             </a:fld>
             <a:endParaRPr lang="en-GB"/>
           </a:p>
@@ -1972,7 +1972,7 @@
           <a:p>
             <a:fld id="{7CFC6544-A9AE-4A12-916D-21615692FB1B}" type="datetimeFigureOut">
               <a:rPr lang="en-GB" smtClean="0"/>
-              <a:t>11/10/2021</a:t>
+              <a:t>18/10/2021</a:t>
             </a:fld>
             <a:endParaRPr lang="en-GB"/>
           </a:p>
@@ -2085,7 +2085,7 @@
           <a:p>
             <a:fld id="{7CFC6544-A9AE-4A12-916D-21615692FB1B}" type="datetimeFigureOut">
               <a:rPr lang="en-GB" smtClean="0"/>
-              <a:t>11/10/2021</a:t>
+              <a:t>18/10/2021</a:t>
             </a:fld>
             <a:endParaRPr lang="en-GB"/>
           </a:p>
@@ -2398,7 +2398,7 @@
           <a:p>
             <a:fld id="{7CFC6544-A9AE-4A12-916D-21615692FB1B}" type="datetimeFigureOut">
               <a:rPr lang="en-GB" smtClean="0"/>
-              <a:t>11/10/2021</a:t>
+              <a:t>18/10/2021</a:t>
             </a:fld>
             <a:endParaRPr lang="en-GB"/>
           </a:p>
@@ -2687,7 +2687,7 @@
           <a:p>
             <a:fld id="{7CFC6544-A9AE-4A12-916D-21615692FB1B}" type="datetimeFigureOut">
               <a:rPr lang="en-GB" smtClean="0"/>
-              <a:t>11/10/2021</a:t>
+              <a:t>18/10/2021</a:t>
             </a:fld>
             <a:endParaRPr lang="en-GB"/>
           </a:p>
@@ -2930,7 +2930,7 @@
           <a:p>
             <a:fld id="{7CFC6544-A9AE-4A12-916D-21615692FB1B}" type="datetimeFigureOut">
               <a:rPr lang="en-GB" smtClean="0"/>
-              <a:t>11/10/2021</a:t>
+              <a:t>18/10/2021</a:t>
             </a:fld>
             <a:endParaRPr lang="en-GB"/>
           </a:p>
@@ -5143,7 +5143,7 @@
 <file path=ppt/theme/theme1.xml><?xml version="1.0" encoding="utf-8"?>
 <a:theme xmlns:a="http://schemas.openxmlformats.org/drawingml/2006/main" name="Office Theme">
   <a:themeElements>
-    <a:clrScheme name="Office">
+    <a:clrScheme name="Blue II">
       <a:dk1>
         <a:sysClr val="windowText" lastClr="000000"/>
       </a:dk1>
@@ -5151,34 +5151,34 @@
         <a:sysClr val="window" lastClr="FFFFFF"/>
       </a:lt1>
       <a:dk2>
-        <a:srgbClr val="44546A"/>
+        <a:srgbClr val="335B74"/>
       </a:dk2>
       <a:lt2>
-        <a:srgbClr val="E7E6E6"/>
+        <a:srgbClr val="DFE3E5"/>
       </a:lt2>
       <a:accent1>
-        <a:srgbClr val="4472C4"/>
+        <a:srgbClr val="1CADE4"/>
       </a:accent1>
       <a:accent2>
-        <a:srgbClr val="ED7D31"/>
+        <a:srgbClr val="2683C6"/>
       </a:accent2>
       <a:accent3>
-        <a:srgbClr val="A5A5A5"/>
+        <a:srgbClr val="27CED7"/>
       </a:accent3>
       <a:accent4>
-        <a:srgbClr val="FFC000"/>
+        <a:srgbClr val="42BA97"/>
       </a:accent4>
       <a:accent5>
-        <a:srgbClr val="5B9BD5"/>
+        <a:srgbClr val="3E8853"/>
       </a:accent5>
       <a:accent6>
-        <a:srgbClr val="70AD47"/>
+        <a:srgbClr val="62A39F"/>
       </a:accent6>
       <a:hlink>
-        <a:srgbClr val="0563C1"/>
+        <a:srgbClr val="6EAC1C"/>
       </a:hlink>
       <a:folHlink>
-        <a:srgbClr val="954F72"/>
+        <a:srgbClr val="B26B02"/>
       </a:folHlink>
     </a:clrScheme>
     <a:fontScheme name="Office">

</xml_diff>